<commit_message>
adds new presentation for polish toy
</commit_message>
<xml_diff>
--- a/assig8/Chromaworks.pptx
+++ b/assig8/Chromaworks.pptx
@@ -5,12 +5,13 @@
     <p:sldMasterId id="2147483654" r:id="rId1"/>
   </p:sldMasterIdLst>
   <p:notesMasterIdLst>
-    <p:notesMasterId r:id="rId5"/>
+    <p:notesMasterId r:id="rId6"/>
   </p:notesMasterIdLst>
   <p:sldIdLst>
     <p:sldId id="256" r:id="rId2"/>
     <p:sldId id="257" r:id="rId3"/>
-    <p:sldId id="258" r:id="rId4"/>
+    <p:sldId id="259" r:id="rId4"/>
+    <p:sldId id="258" r:id="rId5"/>
   </p:sldIdLst>
   <p:sldSz cx="9144000" cy="5143500" type="screen16x9"/>
   <p:notesSz cx="6858000" cy="9144000"/>
@@ -225,6 +226,11 @@
       </a:defRPr>
     </a:lvl9pPr>
   </p:defaultTextStyle>
+  <p:extLst>
+    <p:ext uri="{EFAFB233-063F-42B5-8137-9DF3F51BA10A}">
+      <p15:sldGuideLst xmlns:p15="http://schemas.microsoft.com/office/powerpoint/2012/main"/>
+    </p:ext>
+  </p:extLst>
 </p:presentation>
 </file>
 
@@ -3685,7 +3691,7 @@
           <a:p>
             <a:r>
               <a:rPr lang="en-US" dirty="0" smtClean="0"/>
-              <a:t>Progress</a:t>
+              <a:t>Updates</a:t>
             </a:r>
             <a:endParaRPr lang="en-US" dirty="0"/>
           </a:p>
@@ -3717,7 +3723,7 @@
             </a:pPr>
             <a:r>
               <a:rPr lang="en-US" dirty="0" smtClean="0"/>
-              <a:t>Color Selection</a:t>
+              <a:t>Fireworks explode!</a:t>
             </a:r>
           </a:p>
           <a:p>
@@ -3727,7 +3733,18 @@
             </a:pPr>
             <a:r>
               <a:rPr lang="en-US" dirty="0" smtClean="0"/>
-              <a:t>Simple Fireworks Display</a:t>
+              <a:t>Adds rockets</a:t>
+            </a:r>
+            <a:endParaRPr lang="en-US" dirty="0" smtClean="0"/>
+          </a:p>
+          <a:p>
+            <a:pPr marL="457200" indent="-457200">
+              <a:buFont typeface="Arial" panose="020B0604020202020204" pitchFamily="34" charset="0"/>
+              <a:buChar char="•"/>
+            </a:pPr>
+            <a:r>
+              <a:rPr lang="en-US" dirty="0" smtClean="0"/>
+              <a:t>New visual effects</a:t>
             </a:r>
           </a:p>
           <a:p>
@@ -3737,7 +3754,7 @@
             </a:pPr>
             <a:r>
               <a:rPr lang="en-US" dirty="0" smtClean="0"/>
-              <a:t>Fireworks color generation</a:t>
+              <a:t>Sky illumination</a:t>
             </a:r>
             <a:endParaRPr lang="en-US" dirty="0"/>
           </a:p>
@@ -3764,6 +3781,107 @@
 </file>
 
 <file path=ppt/slides/slide3.xml><?xml version="1.0" encoding="utf-8"?>
+<p:sld xmlns:a="http://schemas.openxmlformats.org/drawingml/2006/main" xmlns:r="http://schemas.openxmlformats.org/officeDocument/2006/relationships" xmlns:p="http://schemas.openxmlformats.org/presentationml/2006/main">
+  <p:cSld>
+    <p:spTree>
+      <p:nvGrpSpPr>
+        <p:cNvPr id="1" name=""/>
+        <p:cNvGrpSpPr/>
+        <p:nvPr/>
+      </p:nvGrpSpPr>
+      <p:grpSpPr>
+        <a:xfrm>
+          <a:off x="0" y="0"/>
+          <a:ext cx="0" cy="0"/>
+          <a:chOff x="0" y="0"/>
+          <a:chExt cx="0" cy="0"/>
+        </a:xfrm>
+      </p:grpSpPr>
+      <p:sp>
+        <p:nvSpPr>
+          <p:cNvPr id="2" name="Title 1"/>
+          <p:cNvSpPr>
+            <a:spLocks noGrp="1"/>
+          </p:cNvSpPr>
+          <p:nvPr>
+            <p:ph type="title"/>
+          </p:nvPr>
+        </p:nvSpPr>
+        <p:spPr/>
+        <p:txBody>
+          <a:bodyPr/>
+          <a:lstStyle/>
+          <a:p>
+            <a:r>
+              <a:rPr lang="en-US" dirty="0" smtClean="0"/>
+              <a:t>Critique</a:t>
+            </a:r>
+            <a:endParaRPr lang="en-US" dirty="0"/>
+          </a:p>
+        </p:txBody>
+      </p:sp>
+      <p:sp>
+        <p:nvSpPr>
+          <p:cNvPr id="3" name="Text Placeholder 2"/>
+          <p:cNvSpPr>
+            <a:spLocks noGrp="1"/>
+          </p:cNvSpPr>
+          <p:nvPr>
+            <p:ph type="body" idx="1"/>
+          </p:nvPr>
+        </p:nvSpPr>
+        <p:spPr>
+          <a:xfrm>
+            <a:off x="457200" y="1244242"/>
+            <a:ext cx="8329546" cy="3630300"/>
+          </a:xfrm>
+        </p:spPr>
+        <p:txBody>
+          <a:bodyPr/>
+          <a:lstStyle/>
+          <a:p>
+            <a:pPr marL="457200" indent="-457200">
+              <a:buFont typeface="Arial" panose="020B0604020202020204" pitchFamily="34" charset="0"/>
+              <a:buChar char="•"/>
+            </a:pPr>
+            <a:r>
+              <a:rPr lang="en-US" dirty="0" smtClean="0"/>
+              <a:t>Made clickable space visible</a:t>
+            </a:r>
+          </a:p>
+          <a:p>
+            <a:pPr marL="457200" indent="-457200">
+              <a:buFont typeface="Arial" panose="020B0604020202020204" pitchFamily="34" charset="0"/>
+              <a:buChar char="•"/>
+            </a:pPr>
+            <a:r>
+              <a:rPr lang="en-US" dirty="0" smtClean="0"/>
+              <a:t>Prioritized explosions</a:t>
+            </a:r>
+          </a:p>
+        </p:txBody>
+      </p:sp>
+    </p:spTree>
+    <p:extLst>
+      <p:ext uri="{BB962C8B-B14F-4D97-AF65-F5344CB8AC3E}">
+        <p14:creationId xmlns:p14="http://schemas.microsoft.com/office/powerpoint/2010/main" val="2139119067"/>
+      </p:ext>
+    </p:extLst>
+  </p:cSld>
+  <p:clrMapOvr>
+    <a:masterClrMapping/>
+  </p:clrMapOvr>
+  <p:timing>
+    <p:tnLst>
+      <p:par>
+        <p:cTn id="1" dur="indefinite" restart="never" nodeType="tmRoot"/>
+      </p:par>
+    </p:tnLst>
+  </p:timing>
+</p:sld>
+</file>
+
+<file path=ppt/slides/slide4.xml><?xml version="1.0" encoding="utf-8"?>
 <p:sld xmlns:a="http://schemas.openxmlformats.org/drawingml/2006/main" xmlns:r="http://schemas.openxmlformats.org/officeDocument/2006/relationships" xmlns:p="http://schemas.openxmlformats.org/presentationml/2006/main">
   <p:cSld>
     <p:spTree>
@@ -3833,7 +3951,7 @@
               <a:rPr lang="en-US" dirty="0" smtClean="0">
                 <a:hlinkClick r:id="rId2"/>
               </a:rPr>
-              <a:t>comicseans.github.io/imgd2900-Zahlen/assig7/cover.html</a:t>
+              <a:t>comicseans.github.io/imgd2900-Zahlen/assig8/cover.html</a:t>
             </a:r>
             <a:endParaRPr lang="en-US" dirty="0" smtClean="0"/>
           </a:p>

</xml_diff>